<commit_message>
added files for assignment
</commit_message>
<xml_diff>
--- a/WhatABook/Whatabook-Prototype.pptx
+++ b/WhatABook/Whatabook-Prototype.pptx
@@ -3381,18 +3381,13 @@
           <a:p>
             <a:pPr algn="ctr"/>
             <a:r>
-              <a:rPr lang="en-US" sz="4000" dirty="0" err="1">
+              <a:rPr lang="en-US" sz="4000" dirty="0">
                 <a:solidFill>
                   <a:schemeClr val="tx1"/>
                 </a:solidFill>
               </a:rPr>
               <a:t>Whatabook</a:t>
             </a:r>
-            <a:endParaRPr lang="en-US" sz="4000" dirty="0">
-              <a:solidFill>
-                <a:schemeClr val="tx1"/>
-              </a:solidFill>
-            </a:endParaRPr>
           </a:p>
         </p:txBody>
       </p:sp>
@@ -4339,18 +4334,13 @@
           <a:p>
             <a:pPr algn="ctr"/>
             <a:r>
-              <a:rPr lang="en-US" sz="4000" dirty="0" err="1">
+              <a:rPr lang="en-US" sz="4000" dirty="0">
                 <a:solidFill>
                   <a:schemeClr val="tx1"/>
                 </a:solidFill>
               </a:rPr>
               <a:t>Whatabook</a:t>
             </a:r>
-            <a:endParaRPr lang="en-US" sz="4000" dirty="0">
-              <a:solidFill>
-                <a:schemeClr val="tx1"/>
-              </a:solidFill>
-            </a:endParaRPr>
           </a:p>
         </p:txBody>
       </p:sp>
@@ -5527,18 +5517,13 @@
           <a:p>
             <a:pPr algn="ctr"/>
             <a:r>
-              <a:rPr lang="en-US" sz="4000" dirty="0" err="1">
+              <a:rPr lang="en-US" sz="4000" dirty="0">
                 <a:solidFill>
                   <a:schemeClr val="tx1"/>
                 </a:solidFill>
               </a:rPr>
               <a:t>Whatabook</a:t>
             </a:r>
-            <a:endParaRPr lang="en-US" sz="4000" dirty="0">
-              <a:solidFill>
-                <a:schemeClr val="tx1"/>
-              </a:solidFill>
-            </a:endParaRPr>
           </a:p>
         </p:txBody>
       </p:sp>
@@ -6609,18 +6594,13 @@
           <a:p>
             <a:pPr algn="ctr"/>
             <a:r>
-              <a:rPr lang="en-US" sz="4000" dirty="0" err="1">
+              <a:rPr lang="en-US" sz="4000" dirty="0">
                 <a:solidFill>
                   <a:schemeClr val="tx1"/>
                 </a:solidFill>
               </a:rPr>
               <a:t>Whatabook</a:t>
             </a:r>
-            <a:endParaRPr lang="en-US" sz="4000" dirty="0">
-              <a:solidFill>
-                <a:schemeClr val="tx1"/>
-              </a:solidFill>
-            </a:endParaRPr>
           </a:p>
         </p:txBody>
       </p:sp>
@@ -8011,18 +7991,13 @@
           <a:p>
             <a:pPr algn="ctr"/>
             <a:r>
-              <a:rPr lang="en-US" sz="4000" dirty="0" err="1">
+              <a:rPr lang="en-US" sz="4000" dirty="0">
                 <a:solidFill>
                   <a:schemeClr val="tx1"/>
                 </a:solidFill>
               </a:rPr>
               <a:t>Whatabook</a:t>
             </a:r>
-            <a:endParaRPr lang="en-US" sz="4000" dirty="0">
-              <a:solidFill>
-                <a:schemeClr val="tx1"/>
-              </a:solidFill>
-            </a:endParaRPr>
           </a:p>
         </p:txBody>
       </p:sp>
@@ -9129,18 +9104,13 @@
           <a:p>
             <a:pPr algn="ctr"/>
             <a:r>
-              <a:rPr lang="en-US" sz="4000" dirty="0" err="1">
+              <a:rPr lang="en-US" sz="4000" dirty="0">
                 <a:solidFill>
                   <a:schemeClr val="tx1"/>
                 </a:solidFill>
               </a:rPr>
               <a:t>Whatabook</a:t>
             </a:r>
-            <a:endParaRPr lang="en-US" sz="4000" dirty="0">
-              <a:solidFill>
-                <a:schemeClr val="tx1"/>
-              </a:solidFill>
-            </a:endParaRPr>
           </a:p>
         </p:txBody>
       </p:sp>
@@ -10107,18 +10077,13 @@
           <a:p>
             <a:pPr algn="ctr"/>
             <a:r>
-              <a:rPr lang="en-US" sz="4000" dirty="0" err="1">
+              <a:rPr lang="en-US" sz="4000" dirty="0">
                 <a:solidFill>
                   <a:schemeClr val="tx1"/>
                 </a:solidFill>
               </a:rPr>
               <a:t>Whatabook</a:t>
             </a:r>
-            <a:endParaRPr lang="en-US" sz="4000" dirty="0">
-              <a:solidFill>
-                <a:schemeClr val="tx1"/>
-              </a:solidFill>
-            </a:endParaRPr>
           </a:p>
         </p:txBody>
       </p:sp>

</xml_diff>